<commit_message>
Deployed 8f78a83 with MkDocs version: 1.1.2
</commit_message>
<xml_diff>
--- a/aulas/07-loops/slides.pptx
+++ b/aulas/07-loops/slides.pptx
@@ -9030,14 +9030,14 @@
       </p:grpSpPr>
       <p:sp>
         <p:nvSpPr>
-          <p:cNvPr id="4" name="CustomShape 1" hidden="0"/>
+          <p:cNvPr id="4" name="Google Shape;252;p53" hidden="0"/>
           <p:cNvSpPr/>
           <p:nvPr isPhoto="0" userDrawn="0"/>
         </p:nvSpPr>
         <p:spPr bwMode="auto">
           <a:xfrm>
             <a:off x="966960" y="2384280"/>
-            <a:ext cx="7342560" cy="713160"/>
+            <a:ext cx="7342560" cy="713155"/>
           </a:xfrm>
           <a:prstGeom prst="rect">
             <a:avLst/>
@@ -9047,52 +9047,50 @@
             <a:noFill/>
           </a:ln>
         </p:spPr>
-        <p:style>
-          <a:lnRef idx="0">
-            <a:srgbClr val="000000"/>
-          </a:lnRef>
-          <a:fillRef idx="0">
-            <a:srgbClr val="000000"/>
-          </a:fillRef>
-          <a:effectRef idx="0">
-            <a:srgbClr val="000000"/>
-          </a:effectRef>
-          <a:fontRef idx="minor"/>
-        </p:style>
         <p:txBody>
-          <a:bodyPr lIns="90000" tIns="45000" rIns="90000" bIns="45000" anchor="t">
+          <a:bodyPr spcFirstLastPara="1" wrap="square" lIns="90000" tIns="45000" rIns="90000" bIns="45000" anchor="t" anchorCtr="0">
             <a:noAutofit/>
           </a:bodyPr>
           <a:lstStyle/>
           <a:p>
-            <a:pPr algn="ctr">
-              <a:lnSpc>
-                <a:spcPct val="100000"/>
-              </a:lnSpc>
+            <a:pPr marL="0" marR="0" lvl="0" indent="0" algn="ctr">
+              <a:lnSpc>
+                <a:spcPct val="100000"/>
+              </a:lnSpc>
+              <a:spcBef>
+                <a:spcPts val="0"/>
+              </a:spcBef>
               <a:spcAft>
-                <a:spcPts val="601"/>
+                <a:spcPts val="0"/>
               </a:spcAft>
-              <a:defRPr/>
-            </a:pPr>
-            <a:r>
-              <a:rPr lang="en-US" sz="3600" b="1" strike="noStrike" spc="-1">
+              <a:buNone/>
+              <a:defRPr/>
+            </a:pPr>
+            <a:r>
+              <a:rPr lang="pt-BR" sz="3600" b="1" i="0" u="none" strike="noStrike" cap="none">
                 <a:solidFill>
                   <a:srgbClr val="FFFFFF"/>
                 </a:solidFill>
-                <a:latin typeface="Arial"/>
+                <a:latin typeface="Verdana"/>
                 <a:ea typeface="Verdana"/>
+                <a:cs typeface="Verdana"/>
               </a:rPr>
               <a:t>Sistemas Hardware-Software</a:t>
             </a:r>
-            <a:endParaRPr lang="en-US" sz="3600" b="0" strike="noStrike" spc="-1">
-              <a:latin typeface="Arial"/>
+            <a:endParaRPr sz="3600" b="0" i="0" u="none" strike="noStrike" cap="none">
+              <a:solidFill>
+                <a:schemeClr val="dk1"/>
+              </a:solidFill>
+              <a:latin typeface="Arial"/>
+              <a:ea typeface="Arial"/>
+              <a:cs typeface="Arial"/>
             </a:endParaRPr>
           </a:p>
         </p:txBody>
       </p:sp>
       <p:sp>
         <p:nvSpPr>
-          <p:cNvPr id="5" name="CustomShape 2" hidden="0"/>
+          <p:cNvPr id="5" name="Google Shape;253;p53" hidden="0"/>
           <p:cNvSpPr/>
           <p:nvPr isPhoto="0" userDrawn="0"/>
         </p:nvSpPr>
@@ -9109,91 +9107,73 @@
             <a:noFill/>
           </a:ln>
         </p:spPr>
-        <p:style>
-          <a:lnRef idx="0">
-            <a:srgbClr val="000000"/>
-          </a:lnRef>
-          <a:fillRef idx="0">
-            <a:srgbClr val="000000"/>
-          </a:fillRef>
-          <a:effectRef idx="0">
-            <a:srgbClr val="000000"/>
-          </a:effectRef>
-          <a:fontRef idx="minor"/>
-        </p:style>
         <p:txBody>
-          <a:bodyPr lIns="90000" tIns="45000" rIns="90000" bIns="45000" anchor="t"/>
+          <a:bodyPr spcFirstLastPara="1" wrap="square" lIns="90000" tIns="45000" rIns="90000" bIns="45000" anchor="t" anchorCtr="0">
+            <a:noAutofit/>
+          </a:bodyPr>
           <a:lstStyle/>
           <a:p>
-            <a:pPr algn="ctr">
+            <a:pPr marL="0" marR="0" lvl="0" indent="0" algn="ctr">
+              <a:lnSpc>
+                <a:spcPct val="100000"/>
+              </a:lnSpc>
               <a:spcBef>
-                <a:spcPts val="400"/>
+                <a:spcPts val="0"/>
               </a:spcBef>
-              <a:defRPr/>
-            </a:pPr>
-            <a:r>
-              <a:rPr lang="en-US" sz="2000" b="0" strike="noStrike" spc="-1">
+              <a:spcAft>
+                <a:spcPts val="0"/>
+              </a:spcAft>
+              <a:buNone/>
+              <a:defRPr/>
+            </a:pPr>
+            <a:r>
+              <a:rPr lang="pt-BR" sz="2000" b="0" i="0" u="none" strike="noStrike" cap="none">
                 <a:solidFill>
                   <a:srgbClr val="FFFFFF"/>
                 </a:solidFill>
                 <a:latin typeface="Verdana"/>
                 <a:ea typeface="Verdana"/>
-              </a:rPr>
-              <a:t>Aula 7 – </a:t>
-            </a:r>
-            <a:r>
-              <a:rPr lang="en-US" sz="2000" spc="-1">
-                <a:solidFill>
-                  <a:srgbClr val="FFFFFF"/>
-                </a:solidFill>
-                <a:latin typeface="Verdana"/>
-                <a:ea typeface="Verdana"/>
-              </a:rPr>
-              <a:t>Revisão</a:t>
-            </a:r>
-            <a:r>
-              <a:rPr lang="en-US" sz="2000" spc="-1">
-                <a:solidFill>
-                  <a:srgbClr val="FFFFFF"/>
-                </a:solidFill>
-                <a:latin typeface="Verdana"/>
-                <a:ea typeface="Verdana"/>
-              </a:rPr>
-              <a:t> de </a:t>
-            </a:r>
-            <a:r>
-              <a:rPr lang="en-US" sz="2000" spc="-1">
-                <a:solidFill>
-                  <a:srgbClr val="FFFFFF"/>
-                </a:solidFill>
-                <a:latin typeface="Verdana"/>
-                <a:ea typeface="Verdana"/>
-              </a:rPr>
-              <a:t>condicionais</a:t>
-            </a:r>
-            <a:r>
-              <a:rPr lang="en-US" sz="2000" spc="-1">
-                <a:solidFill>
-                  <a:srgbClr val="FFFFFF"/>
-                </a:solidFill>
-                <a:latin typeface="Verdana"/>
-                <a:ea typeface="Verdana"/>
-              </a:rPr>
-              <a:t> e Loops </a:t>
-            </a:r>
-            <a:endParaRPr lang="en-US" sz="2000" b="0" strike="noStrike" spc="-1">
+                <a:cs typeface="Verdana"/>
+              </a:rPr>
+              <a:t>Aula 07 – Loops</a:t>
+            </a:r>
+            <a:endParaRPr sz="2000" b="0" i="0" u="none" strike="noStrike" cap="none">
               <a:solidFill>
-                <a:srgbClr val="FFFFFF"/>
+                <a:schemeClr val="dk1"/>
               </a:solidFill>
-              <a:latin typeface="Verdana"/>
-              <a:ea typeface="Verdana"/>
+              <a:latin typeface="Arial"/>
+              <a:ea typeface="Arial"/>
+              <a:cs typeface="Arial"/>
+            </a:endParaRPr>
+          </a:p>
+          <a:p>
+            <a:pPr marL="0" marR="0" lvl="0" indent="0" algn="ctr">
+              <a:lnSpc>
+                <a:spcPct val="100000"/>
+              </a:lnSpc>
+              <a:spcBef>
+                <a:spcPts val="394"/>
+              </a:spcBef>
+              <a:spcAft>
+                <a:spcPts val="0"/>
+              </a:spcAft>
+              <a:buNone/>
+              <a:defRPr/>
+            </a:pPr>
+            <a:endParaRPr sz="2000" b="0" i="0" u="none" strike="noStrike" cap="none">
+              <a:solidFill>
+                <a:schemeClr val="dk1"/>
+              </a:solidFill>
+              <a:latin typeface="Arial"/>
+              <a:ea typeface="Arial"/>
+              <a:cs typeface="Arial"/>
             </a:endParaRPr>
           </a:p>
         </p:txBody>
       </p:sp>
       <p:sp>
         <p:nvSpPr>
-          <p:cNvPr id="6" name="CustomShape 3" hidden="0"/>
+          <p:cNvPr id="6" name="Google Shape;254;p53" hidden="0"/>
           <p:cNvSpPr/>
           <p:nvPr isPhoto="0" userDrawn="0"/>
         </p:nvSpPr>
@@ -9210,132 +9190,119 @@
             <a:noFill/>
           </a:ln>
         </p:spPr>
-        <p:style>
-          <a:lnRef idx="0">
-            <a:srgbClr val="000000"/>
-          </a:lnRef>
-          <a:fillRef idx="0">
-            <a:srgbClr val="000000"/>
-          </a:fillRef>
-          <a:effectRef idx="0">
-            <a:srgbClr val="000000"/>
-          </a:effectRef>
-          <a:fontRef idx="minor"/>
-        </p:style>
         <p:txBody>
-          <a:bodyPr lIns="90000" tIns="45000" rIns="90000" bIns="45000" anchor="t"/>
+          <a:bodyPr spcFirstLastPara="1" wrap="square" lIns="90000" tIns="45000" rIns="90000" bIns="45000" anchor="t" anchorCtr="0">
+            <a:noAutofit/>
+          </a:bodyPr>
           <a:lstStyle/>
           <a:p>
-            <a:pPr algn="r">
+            <a:pPr marL="0" marR="0" lvl="0" indent="0" algn="r">
               <a:lnSpc>
                 <a:spcPct val="100000"/>
               </a:lnSpc>
               <a:spcBef>
-                <a:spcPts val="281"/>
+                <a:spcPts val="0"/>
               </a:spcBef>
-              <a:defRPr/>
-            </a:pPr>
-            <a:r>
-              <a:rPr lang="en-US" sz="1400" spc="-1">
+              <a:spcAft>
+                <a:spcPts val="0"/>
+              </a:spcAft>
+              <a:buNone/>
+              <a:defRPr/>
+            </a:pPr>
+            <a:r>
+              <a:rPr lang="pt-BR" sz="1400" b="0" i="0" u="none" strike="noStrike" cap="none">
                 <a:solidFill>
                   <a:srgbClr val="FFFFFF"/>
                 </a:solidFill>
                 <a:latin typeface="Verdana"/>
                 <a:ea typeface="Verdana"/>
-              </a:rPr>
-              <a:t>2020</a:t>
-            </a:r>
-            <a:r>
-              <a:rPr lang="en-US" sz="1400" b="0" strike="noStrike" spc="-1">
+                <a:cs typeface="Verdana"/>
+              </a:rPr>
+              <a:t>20</a:t>
+            </a:r>
+            <a:r>
+              <a:rPr lang="pt-BR" sz="1400">
                 <a:solidFill>
                   <a:srgbClr val="FFFFFF"/>
                 </a:solidFill>
                 <a:latin typeface="Verdana"/>
                 <a:ea typeface="Verdana"/>
-              </a:rPr>
-              <a:t> – </a:t>
-            </a:r>
-            <a:r>
-              <a:rPr lang="en-US" sz="1400" b="0" strike="noStrike" spc="-1">
+                <a:cs typeface="Verdana"/>
+              </a:rPr>
+              <a:t>21</a:t>
+            </a:r>
+            <a:r>
+              <a:rPr lang="pt-BR" sz="1400" b="0" i="0" u="none" strike="noStrike" cap="none">
                 <a:solidFill>
                   <a:srgbClr val="FFFFFF"/>
                 </a:solidFill>
                 <a:latin typeface="Verdana"/>
                 <a:ea typeface="Verdana"/>
-              </a:rPr>
-              <a:t>Engenharia</a:t>
-            </a:r>
-            <a:endParaRPr lang="en-US" sz="1400" b="0" strike="noStrike" spc="-1">
-              <a:latin typeface="Arial"/>
-            </a:endParaRPr>
-          </a:p>
-          <a:p>
-            <a:pPr algn="r">
+                <a:cs typeface="Verdana"/>
+              </a:rPr>
+              <a:t> – Engenharia</a:t>
+            </a:r>
+            <a:endParaRPr sz="1400" b="0" i="0" u="none" strike="noStrike" cap="none">
+              <a:solidFill>
+                <a:schemeClr val="dk1"/>
+              </a:solidFill>
+              <a:latin typeface="Verdana"/>
+              <a:ea typeface="Verdana"/>
+              <a:cs typeface="Verdana"/>
+            </a:endParaRPr>
+          </a:p>
+          <a:p>
+            <a:pPr marL="0" marR="0" lvl="0" indent="0" algn="r">
               <a:lnSpc>
                 <a:spcPct val="100000"/>
               </a:lnSpc>
               <a:spcBef>
-                <a:spcPts val="281"/>
+                <a:spcPts val="276"/>
               </a:spcBef>
-              <a:defRPr/>
-            </a:pPr>
-            <a:endParaRPr lang="en-US" sz="1400" b="0" strike="noStrike" spc="-1">
-              <a:latin typeface="Arial"/>
-            </a:endParaRPr>
-          </a:p>
-          <a:p>
-            <a:pPr algn="r">
+              <a:spcAft>
+                <a:spcPts val="0"/>
+              </a:spcAft>
+              <a:buNone/>
+              <a:defRPr/>
+            </a:pPr>
+            <a:endParaRPr sz="1400" b="0" i="0" u="none" strike="noStrike" cap="none">
+              <a:solidFill>
+                <a:schemeClr val="dk1"/>
+              </a:solidFill>
+              <a:latin typeface="Verdana"/>
+              <a:ea typeface="Verdana"/>
+              <a:cs typeface="Verdana"/>
+            </a:endParaRPr>
+          </a:p>
+          <a:p>
+            <a:pPr marL="0" marR="0" lvl="0" indent="0" algn="r">
               <a:lnSpc>
                 <a:spcPct val="100000"/>
               </a:lnSpc>
               <a:spcBef>
-                <a:spcPts val="281"/>
+                <a:spcPts val="276"/>
               </a:spcBef>
-              <a:defRPr/>
-            </a:pPr>
-            <a:r>
-              <a:rPr lang="en-US" sz="1400" b="0" u="sng" strike="noStrike" spc="-1">
+              <a:spcAft>
+                <a:spcPts val="0"/>
+              </a:spcAft>
+              <a:buNone/>
+              <a:defRPr/>
+            </a:pPr>
+            <a:r>
+              <a:rPr lang="pt-BR" sz="1400" b="0" i="0" u="none" strike="noStrike" cap="none">
                 <a:solidFill>
                   <a:srgbClr val="FFFFFF"/>
                 </a:solidFill>
                 <a:latin typeface="Verdana"/>
                 <a:ea typeface="Verdana"/>
-                <a:hlinkClick r:id="rId2" tooltip="mailto:igorsm1@insper.edu.br"/>
+                <a:cs typeface="Verdana"/>
               </a:rPr>
               <a:t>Igor Montagner</a:t>
             </a:r>
-            <a:r>
-              <a:rPr lang="en-US" sz="1400" b="0" strike="noStrike" spc="-1">
-                <a:solidFill>
-                  <a:srgbClr val="FFFFFF"/>
-                </a:solidFill>
-                <a:latin typeface="Verdana"/>
-                <a:ea typeface="Verdana"/>
-              </a:rPr>
-              <a:t>, </a:t>
-            </a:r>
-            <a:r>
-              <a:rPr lang="en-US" sz="1400" b="0" strike="noStrike" spc="-1">
-                <a:solidFill>
-                  <a:srgbClr val="FFFFFF"/>
-                </a:solidFill>
-                <a:latin typeface="Verdana"/>
-                <a:ea typeface="Verdana"/>
-              </a:rPr>
-              <a:t>Fábio</a:t>
-            </a:r>
-            <a:r>
-              <a:rPr lang="en-US" sz="1400" b="0" strike="noStrike" spc="-1">
-                <a:solidFill>
-                  <a:srgbClr val="FFFFFF"/>
-                </a:solidFill>
-                <a:latin typeface="Verdana"/>
-                <a:ea typeface="Verdana"/>
-              </a:rPr>
-              <a:t> Ayres</a:t>
-            </a:r>
-            <a:endParaRPr lang="en-US" sz="1400" b="0" strike="noStrike" spc="-1">
-              <a:latin typeface="Arial"/>
+            <a:endParaRPr sz="1400">
+              <a:latin typeface="Verdana"/>
+              <a:ea typeface="Verdana"/>
+              <a:cs typeface="Verdana"/>
             </a:endParaRPr>
           </a:p>
         </p:txBody>
@@ -10181,7 +10148,7 @@
           <p:nvPr isPhoto="0" userDrawn="0"/>
         </p:nvSpPr>
         <p:spPr bwMode="auto">
-          <a:xfrm rot="16199999">
+          <a:xfrm rot="16199998">
             <a:off x="3733560" y="2852280"/>
             <a:ext cx="761040" cy="1522800"/>
           </a:xfrm>
@@ -14037,7 +14004,7 @@
           <p:nvPr isPhoto="0" userDrawn="0"/>
         </p:nvSpPr>
         <p:spPr bwMode="auto">
-          <a:xfrm rot="16199999">
+          <a:xfrm rot="16199998">
             <a:off x="4038480" y="4179240"/>
             <a:ext cx="761040" cy="1522800"/>
           </a:xfrm>
@@ -18926,6 +18893,7 @@
                       <a:solidFill>
                         <a:srgbClr val="FFFFFF"/>
                       </a:solidFill>
+                      <a:round/>
                     </a:lnB>
                     <a:solidFill>
                       <a:srgbClr val="4F81BD"/>
@@ -18977,6 +18945,7 @@
                       <a:solidFill>
                         <a:srgbClr val="FFFFFF"/>
                       </a:solidFill>
+                      <a:round/>
                     </a:lnB>
                     <a:solidFill>
                       <a:srgbClr val="4F81BD"/>
@@ -19015,6 +18984,7 @@
                       <a:solidFill>
                         <a:srgbClr val="FFFFFF"/>
                       </a:solidFill>
+                      <a:round/>
                     </a:lnL>
                     <a:lnR w="12240" algn="ctr">
                       <a:solidFill>
@@ -19076,6 +19046,7 @@
                       <a:solidFill>
                         <a:srgbClr val="FFFFFF"/>
                       </a:solidFill>
+                      <a:round/>
                     </a:lnL>
                     <a:lnR w="12240" algn="ctr">
                       <a:solidFill>
@@ -19129,6 +19100,7 @@
                       <a:solidFill>
                         <a:srgbClr val="FFFFFF"/>
                       </a:solidFill>
+                      <a:round/>
                     </a:lnL>
                     <a:lnR w="12240" algn="ctr">
                       <a:solidFill>
@@ -19180,6 +19152,7 @@
                       <a:solidFill>
                         <a:srgbClr val="FFFFFF"/>
                       </a:solidFill>
+                      <a:round/>
                     </a:lnL>
                     <a:lnR w="12240" algn="ctr">
                       <a:solidFill>
@@ -19347,6 +19320,7 @@
                       <a:solidFill>
                         <a:srgbClr val="FFFFFF"/>
                       </a:solidFill>
+                      <a:round/>
                     </a:lnL>
                     <a:lnR w="12240" algn="ctr">
                       <a:solidFill>
@@ -19445,6 +19419,7 @@
                       <a:solidFill>
                         <a:srgbClr val="FFFFFF"/>
                       </a:solidFill>
+                      <a:round/>
                     </a:lnR>
                     <a:lnT w="12240" algn="ctr">
                       <a:solidFill>

</xml_diff>